<commit_message>
Edit in presentation files
</commit_message>
<xml_diff>
--- a/Presentation/Shift_Reduce_Parsers_Presentation.pptx
+++ b/Presentation/Shift_Reduce_Parsers_Presentation.pptx
@@ -695,7 +695,7 @@
           <a:p>
             <a:fld id="{6F087016-4366-41E0-84B0-E1E9AB4072CA}" type="datetimeFigureOut">
               <a:rPr lang="en-US" smtClean="0"/>
-              <a:t>2022-05-12</a:t>
+              <a:t>2022-05-16</a:t>
             </a:fld>
             <a:endParaRPr lang="en-US"/>
           </a:p>
@@ -893,7 +893,7 @@
           <a:p>
             <a:fld id="{6F087016-4366-41E0-84B0-E1E9AB4072CA}" type="datetimeFigureOut">
               <a:rPr lang="en-US" smtClean="0"/>
-              <a:t>2022-05-12</a:t>
+              <a:t>2022-05-16</a:t>
             </a:fld>
             <a:endParaRPr lang="en-US"/>
           </a:p>
@@ -1101,7 +1101,7 @@
           <a:p>
             <a:fld id="{6F087016-4366-41E0-84B0-E1E9AB4072CA}" type="datetimeFigureOut">
               <a:rPr lang="en-US" smtClean="0"/>
-              <a:t>2022-05-12</a:t>
+              <a:t>2022-05-16</a:t>
             </a:fld>
             <a:endParaRPr lang="en-US"/>
           </a:p>
@@ -2617,7 +2617,7 @@
           <a:p>
             <a:fld id="{6F087016-4366-41E0-84B0-E1E9AB4072CA}" type="datetimeFigureOut">
               <a:rPr lang="en-US" smtClean="0"/>
-              <a:t>2022-05-12</a:t>
+              <a:t>2022-05-16</a:t>
             </a:fld>
             <a:endParaRPr lang="en-US"/>
           </a:p>
@@ -3654,7 +3654,7 @@
           <a:p>
             <a:fld id="{6F087016-4366-41E0-84B0-E1E9AB4072CA}" type="datetimeFigureOut">
               <a:rPr lang="en-US" smtClean="0"/>
-              <a:t>2022-05-12</a:t>
+              <a:t>2022-05-16</a:t>
             </a:fld>
             <a:endParaRPr lang="en-US"/>
           </a:p>
@@ -3919,7 +3919,7 @@
           <a:p>
             <a:fld id="{6F087016-4366-41E0-84B0-E1E9AB4072CA}" type="datetimeFigureOut">
               <a:rPr lang="en-US" smtClean="0"/>
-              <a:t>2022-05-12</a:t>
+              <a:t>2022-05-16</a:t>
             </a:fld>
             <a:endParaRPr lang="en-US"/>
           </a:p>
@@ -4331,7 +4331,7 @@
           <a:p>
             <a:fld id="{6F087016-4366-41E0-84B0-E1E9AB4072CA}" type="datetimeFigureOut">
               <a:rPr lang="en-US" smtClean="0"/>
-              <a:t>2022-05-12</a:t>
+              <a:t>2022-05-16</a:t>
             </a:fld>
             <a:endParaRPr lang="en-US"/>
           </a:p>
@@ -4472,7 +4472,7 @@
           <a:p>
             <a:fld id="{6F087016-4366-41E0-84B0-E1E9AB4072CA}" type="datetimeFigureOut">
               <a:rPr lang="en-US" smtClean="0"/>
-              <a:t>2022-05-12</a:t>
+              <a:t>2022-05-16</a:t>
             </a:fld>
             <a:endParaRPr lang="en-US"/>
           </a:p>
@@ -4585,7 +4585,7 @@
           <a:p>
             <a:fld id="{6F087016-4366-41E0-84B0-E1E9AB4072CA}" type="datetimeFigureOut">
               <a:rPr lang="en-US" smtClean="0"/>
-              <a:t>2022-05-12</a:t>
+              <a:t>2022-05-16</a:t>
             </a:fld>
             <a:endParaRPr lang="en-US"/>
           </a:p>
@@ -4896,7 +4896,7 @@
           <a:p>
             <a:fld id="{6F087016-4366-41E0-84B0-E1E9AB4072CA}" type="datetimeFigureOut">
               <a:rPr lang="en-US" smtClean="0"/>
-              <a:t>2022-05-12</a:t>
+              <a:t>2022-05-16</a:t>
             </a:fld>
             <a:endParaRPr lang="en-US"/>
           </a:p>
@@ -5184,7 +5184,7 @@
           <a:p>
             <a:fld id="{6F087016-4366-41E0-84B0-E1E9AB4072CA}" type="datetimeFigureOut">
               <a:rPr lang="en-US" smtClean="0"/>
-              <a:t>2022-05-12</a:t>
+              <a:t>2022-05-16</a:t>
             </a:fld>
             <a:endParaRPr lang="en-US"/>
           </a:p>
@@ -5425,7 +5425,7 @@
           <a:p>
             <a:fld id="{6F087016-4366-41E0-84B0-E1E9AB4072CA}" type="datetimeFigureOut">
               <a:rPr lang="en-US" smtClean="0"/>
-              <a:t>2022-05-12</a:t>
+              <a:t>2022-05-16</a:t>
             </a:fld>
             <a:endParaRPr lang="en-US"/>
           </a:p>
@@ -5908,7 +5908,7 @@
         <p:spPr>
           <a:xfrm>
             <a:off x="1" y="2843662"/>
-            <a:ext cx="12192000" cy="933589"/>
+            <a:ext cx="12192000" cy="1590179"/>
           </a:xfrm>
           <a:prstGeom prst="rect">
             <a:avLst/>
@@ -5927,85 +5927,85 @@
               </a:spcBef>
             </a:pPr>
             <a:r>
-              <a:rPr lang="en-US" sz="3600" spc="150" dirty="0" err="1">
+              <a:rPr lang="en-US" sz="3600" spc="150" dirty="0" err="1" smtClean="0">
                 <a:latin typeface="Montserrat SemiBold" panose="00000700000000000000" pitchFamily="50" charset="0"/>
               </a:rPr>
               <a:t>Xây</a:t>
             </a:r>
             <a:r>
-              <a:rPr lang="en-US" sz="3600" spc="150" dirty="0">
+              <a:rPr lang="en-US" sz="3600" spc="150" dirty="0" smtClean="0">
                 <a:latin typeface="Montserrat SemiBold" panose="00000700000000000000" pitchFamily="50" charset="0"/>
               </a:rPr>
               <a:t> </a:t>
             </a:r>
             <a:r>
-              <a:rPr lang="en-US" sz="3600" spc="150" dirty="0" err="1">
+              <a:rPr lang="en-US" sz="3600" spc="150" dirty="0" err="1" smtClean="0">
                 <a:latin typeface="Montserrat SemiBold" panose="00000700000000000000" pitchFamily="50" charset="0"/>
               </a:rPr>
               <a:t>Dựng</a:t>
             </a:r>
             <a:r>
-              <a:rPr lang="en-US" sz="3600" spc="150" dirty="0">
+              <a:rPr lang="en-US" sz="3600" spc="150" dirty="0" smtClean="0">
                 <a:latin typeface="Montserrat SemiBold" panose="00000700000000000000" pitchFamily="50" charset="0"/>
               </a:rPr>
               <a:t> </a:t>
             </a:r>
             <a:r>
-              <a:rPr lang="en-US" sz="3600" spc="150" dirty="0" err="1">
+              <a:rPr lang="en-US" sz="3600" spc="150" dirty="0" err="1" smtClean="0">
                 <a:latin typeface="Montserrat SemiBold" panose="00000700000000000000" pitchFamily="50" charset="0"/>
               </a:rPr>
               <a:t>Bộ</a:t>
             </a:r>
             <a:r>
-              <a:rPr lang="en-US" sz="3600" spc="150" dirty="0">
+              <a:rPr lang="en-US" sz="3600" spc="150" dirty="0" smtClean="0">
                 <a:latin typeface="Montserrat SemiBold" panose="00000700000000000000" pitchFamily="50" charset="0"/>
               </a:rPr>
               <a:t> </a:t>
             </a:r>
             <a:r>
-              <a:rPr lang="en-US" sz="3600" spc="150" dirty="0" err="1">
+              <a:rPr lang="en-US" sz="3600" spc="150" dirty="0" err="1" smtClean="0">
                 <a:latin typeface="Montserrat SemiBold" panose="00000700000000000000" pitchFamily="50" charset="0"/>
               </a:rPr>
               <a:t>Phân</a:t>
             </a:r>
             <a:r>
-              <a:rPr lang="en-US" sz="3600" spc="150" dirty="0">
+              <a:rPr lang="en-US" sz="3600" spc="150" dirty="0" smtClean="0">
                 <a:latin typeface="Montserrat SemiBold" panose="00000700000000000000" pitchFamily="50" charset="0"/>
               </a:rPr>
               <a:t> </a:t>
             </a:r>
             <a:r>
-              <a:rPr lang="en-US" sz="3600" spc="150" dirty="0" err="1">
+              <a:rPr lang="en-US" sz="3600" spc="150" dirty="0" err="1" smtClean="0">
                 <a:latin typeface="Montserrat SemiBold" panose="00000700000000000000" pitchFamily="50" charset="0"/>
               </a:rPr>
               <a:t>Tích</a:t>
             </a:r>
             <a:r>
-              <a:rPr lang="en-US" sz="3600" spc="150" dirty="0">
+              <a:rPr lang="en-US" sz="3600" spc="150" dirty="0" smtClean="0">
                 <a:latin typeface="Montserrat SemiBold" panose="00000700000000000000" pitchFamily="50" charset="0"/>
               </a:rPr>
               <a:t> </a:t>
             </a:r>
             <a:r>
-              <a:rPr lang="en-US" sz="3600" spc="150" dirty="0" err="1">
+              <a:rPr lang="en-US" sz="3600" spc="150" dirty="0" err="1" smtClean="0">
                 <a:latin typeface="Montserrat SemiBold" panose="00000700000000000000" pitchFamily="50" charset="0"/>
               </a:rPr>
               <a:t>Cú</a:t>
             </a:r>
             <a:r>
-              <a:rPr lang="en-US" sz="3600" spc="150" dirty="0">
+              <a:rPr lang="en-US" sz="3600" spc="150" dirty="0" smtClean="0">
                 <a:latin typeface="Montserrat SemiBold" panose="00000700000000000000" pitchFamily="50" charset="0"/>
               </a:rPr>
               <a:t> </a:t>
             </a:r>
             <a:r>
-              <a:rPr lang="en-US" sz="3600" spc="150" dirty="0" err="1">
+              <a:rPr lang="en-US" sz="3600" spc="150" dirty="0" err="1" smtClean="0">
                 <a:latin typeface="Montserrat SemiBold" panose="00000700000000000000" pitchFamily="50" charset="0"/>
               </a:rPr>
               <a:t>Pháp</a:t>
             </a:r>
             <a:r>
-              <a:rPr lang="en-US" sz="3600" spc="150" dirty="0">
+              <a:rPr lang="en-US" sz="3600" spc="150" dirty="0" smtClean="0">
                 <a:latin typeface="Montserrat SemiBold" panose="00000700000000000000" pitchFamily="50" charset="0"/>
               </a:rPr>
               <a:t> </a:t>
@@ -6018,11 +6018,55 @@
               </a:spcBef>
             </a:pPr>
             <a:r>
+              <a:rPr lang="en-US" sz="3600" spc="150" dirty="0" smtClean="0">
+                <a:latin typeface="Montserrat SemiBold" panose="00000700000000000000" pitchFamily="50" charset="0"/>
+              </a:rPr>
+              <a:t>Cho </a:t>
+            </a:r>
+            <a:r>
+              <a:rPr lang="en-US" sz="3600" spc="150" dirty="0" err="1" smtClean="0">
+                <a:latin typeface="Montserrat SemiBold" panose="00000700000000000000" pitchFamily="50" charset="0"/>
+              </a:rPr>
+              <a:t>Ngôn</a:t>
+            </a:r>
+            <a:r>
+              <a:rPr lang="en-US" sz="3600" spc="150" dirty="0" smtClean="0">
+                <a:latin typeface="Montserrat SemiBold" panose="00000700000000000000" pitchFamily="50" charset="0"/>
+              </a:rPr>
+              <a:t> </a:t>
+            </a:r>
+            <a:r>
+              <a:rPr lang="en-US" sz="3600" spc="150" dirty="0" err="1" smtClean="0">
+                <a:latin typeface="Montserrat SemiBold" panose="00000700000000000000" pitchFamily="50" charset="0"/>
+              </a:rPr>
+              <a:t>Ngữ</a:t>
+            </a:r>
+            <a:r>
+              <a:rPr lang="en-US" sz="3600" spc="150" dirty="0" smtClean="0">
+                <a:latin typeface="Montserrat SemiBold" panose="00000700000000000000" pitchFamily="50" charset="0"/>
+              </a:rPr>
+              <a:t> Python </a:t>
+            </a:r>
+          </a:p>
+          <a:p>
+            <a:pPr algn="ctr">
+              <a:spcBef>
+                <a:spcPts val="800"/>
+              </a:spcBef>
+            </a:pPr>
+            <a:r>
+              <a:rPr lang="en-US" sz="1200" spc="200" dirty="0" smtClean="0">
+                <a:latin typeface="Times New Roman" panose="02020603050405020304" pitchFamily="18" charset="0"/>
+                <a:cs typeface="Times New Roman" panose="02020603050405020304" pitchFamily="18" charset="0"/>
+              </a:rPr>
+              <a:t>NGUYỄN </a:t>
+            </a:r>
+            <a:r>
               <a:rPr lang="en-US" sz="1200" spc="200" dirty="0">
                 <a:latin typeface="Times New Roman" panose="02020603050405020304" pitchFamily="18" charset="0"/>
                 <a:cs typeface="Times New Roman" panose="02020603050405020304" pitchFamily="18" charset="0"/>
               </a:rPr>
-              <a:t>NGUYỄN HUỲNH HẢI ĐĂNG</a:t>
+              <a:t>HUỲNH HẢI ĐĂNG</a:t>
             </a:r>
             <a:endParaRPr lang="ru-RU" sz="1200" spc="200" dirty="0">
               <a:latin typeface="Times New Roman" panose="02020603050405020304" pitchFamily="18" charset="0"/>
@@ -33202,18 +33246,18 @@
 </file>
 
 <file path=customXml/item1.xml><?xml version="1.0" encoding="utf-8"?>
-<p:properties xmlns:p="http://schemas.microsoft.com/office/2006/metadata/properties" xmlns:xsi="http://www.w3.org/2001/XMLSchema-instance" xmlns:pc="http://schemas.microsoft.com/office/infopath/2007/PartnerControls">
-  <documentManagement/>
-</p:properties>
-</file>
-
-<file path=customXml/item2.xml><?xml version="1.0" encoding="utf-8"?>
 <?mso-contentType ?>
 <FormTemplates xmlns="http://schemas.microsoft.com/sharepoint/v3/contenttype/forms">
   <Display>DocumentLibraryForm</Display>
   <Edit>DocumentLibraryForm</Edit>
   <New>DocumentLibraryForm</New>
 </FormTemplates>
+</file>
+
+<file path=customXml/item2.xml><?xml version="1.0" encoding="utf-8"?>
+<p:properties xmlns:p="http://schemas.microsoft.com/office/2006/metadata/properties" xmlns:xsi="http://www.w3.org/2001/XMLSchema-instance" xmlns:pc="http://schemas.microsoft.com/office/infopath/2007/PartnerControls">
+  <documentManagement/>
+</p:properties>
 </file>
 
 <file path=customXml/item3.xml><?xml version="1.0" encoding="utf-8"?>
@@ -33440,6 +33484,14 @@
 </file>
 
 <file path=customXml/itemProps1.xml><?xml version="1.0" encoding="utf-8"?>
+<ds:datastoreItem xmlns:ds="http://schemas.openxmlformats.org/officeDocument/2006/customXml" ds:itemID="{4DBC78AF-8D5F-449F-9C4B-7B4E40B9D768}">
+  <ds:schemaRefs>
+    <ds:schemaRef ds:uri="http://schemas.microsoft.com/sharepoint/v3/contenttype/forms"/>
+  </ds:schemaRefs>
+</ds:datastoreItem>
+</file>
+
+<file path=customXml/itemProps2.xml><?xml version="1.0" encoding="utf-8"?>
 <ds:datastoreItem xmlns:ds="http://schemas.openxmlformats.org/officeDocument/2006/customXml" ds:itemID="{20610878-2683-4048-B88F-503163D654A3}">
   <ds:schemaRefs>
     <ds:schemaRef ds:uri="http://schemas.microsoft.com/office/2006/metadata/properties"/>
@@ -33452,14 +33504,6 @@
     <ds:schemaRef ds:uri="http://purl.org/dc/dcmitype/"/>
     <ds:schemaRef ds:uri="http://purl.org/dc/terms/"/>
     <ds:schemaRef ds:uri="191f001b-63df-4d49-aa15-0ce731e78454"/>
-  </ds:schemaRefs>
-</ds:datastoreItem>
-</file>
-
-<file path=customXml/itemProps2.xml><?xml version="1.0" encoding="utf-8"?>
-<ds:datastoreItem xmlns:ds="http://schemas.openxmlformats.org/officeDocument/2006/customXml" ds:itemID="{4DBC78AF-8D5F-449F-9C4B-7B4E40B9D768}">
-  <ds:schemaRefs>
-    <ds:schemaRef ds:uri="http://schemas.microsoft.com/sharepoint/v3/contenttype/forms"/>
   </ds:schemaRefs>
 </ds:datastoreItem>
 </file>

</xml_diff>